<commit_message>
update code and ppt
</commit_message>
<xml_diff>
--- a/M104020014周紘樟_ITR_HW2.pptx
+++ b/M104020014周紘樟_ITR_HW2.pptx
@@ -212,7 +212,7 @@
           <a:p>
             <a:fld id="{E9C7C8D6-8378-491C-A88C-F5C0F1DDB3DF}" type="datetimeFigureOut">
               <a:rPr lang="zh-CN" altLang="en-US" smtClean="0"/>
-              <a:t>2022/5/21</a:t>
+              <a:t>2022/5/24</a:t>
             </a:fld>
             <a:endParaRPr lang="zh-CN" altLang="en-US"/>
           </a:p>
@@ -962,7 +962,7 @@
           <a:p>
             <a:fld id="{EE4C556E-D11A-48D7-81C0-B1B5323EC136}" type="datetimeFigureOut">
               <a:rPr lang="zh-CN" altLang="en-US" smtClean="0"/>
-              <a:t>2022/5/21</a:t>
+              <a:t>2022/5/24</a:t>
             </a:fld>
             <a:endParaRPr lang="zh-CN" altLang="en-US"/>
           </a:p>
@@ -1250,7 +1250,7 @@
           <a:p>
             <a:fld id="{EE4C556E-D11A-48D7-81C0-B1B5323EC136}" type="datetimeFigureOut">
               <a:rPr lang="zh-CN" altLang="en-US" smtClean="0"/>
-              <a:t>2022/5/21</a:t>
+              <a:t>2022/5/24</a:t>
             </a:fld>
             <a:endParaRPr lang="zh-CN" altLang="en-US"/>
           </a:p>
@@ -1448,7 +1448,7 @@
           <a:p>
             <a:fld id="{EE4C556E-D11A-48D7-81C0-B1B5323EC136}" type="datetimeFigureOut">
               <a:rPr lang="zh-CN" altLang="en-US" smtClean="0"/>
-              <a:t>2022/5/21</a:t>
+              <a:t>2022/5/24</a:t>
             </a:fld>
             <a:endParaRPr lang="zh-CN" altLang="en-US"/>
           </a:p>
@@ -1656,7 +1656,7 @@
           <a:p>
             <a:fld id="{EE4C556E-D11A-48D7-81C0-B1B5323EC136}" type="datetimeFigureOut">
               <a:rPr lang="zh-CN" altLang="en-US" smtClean="0"/>
-              <a:t>2022/5/21</a:t>
+              <a:t>2022/5/24</a:t>
             </a:fld>
             <a:endParaRPr lang="zh-CN" altLang="en-US"/>
           </a:p>
@@ -1865,7 +1865,7 @@
                 </a:solidFill>
               </a:rPr>
               <a:pPr/>
-              <a:t>2022/5/21</a:t>
+              <a:t>2022/5/24</a:t>
             </a:fld>
             <a:endParaRPr lang="zh-CN" altLang="en-US">
               <a:solidFill>
@@ -2095,7 +2095,7 @@
                 </a:solidFill>
               </a:rPr>
               <a:pPr/>
-              <a:t>2022/5/21</a:t>
+              <a:t>2022/5/24</a:t>
             </a:fld>
             <a:endParaRPr lang="zh-CN" altLang="en-US">
               <a:solidFill>
@@ -2344,7 +2344,7 @@
           <a:p>
             <a:fld id="{EE4C556E-D11A-48D7-81C0-B1B5323EC136}" type="datetimeFigureOut">
               <a:rPr lang="zh-CN" altLang="en-US" smtClean="0"/>
-              <a:t>2022/5/21</a:t>
+              <a:t>2022/5/24</a:t>
             </a:fld>
             <a:endParaRPr lang="zh-CN" altLang="en-US"/>
           </a:p>
@@ -2619,7 +2619,7 @@
           <a:p>
             <a:fld id="{EE4C556E-D11A-48D7-81C0-B1B5323EC136}" type="datetimeFigureOut">
               <a:rPr lang="zh-CN" altLang="en-US" smtClean="0"/>
-              <a:t>2022/5/21</a:t>
+              <a:t>2022/5/24</a:t>
             </a:fld>
             <a:endParaRPr lang="zh-CN" altLang="en-US"/>
           </a:p>
@@ -2884,7 +2884,7 @@
           <a:p>
             <a:fld id="{EE4C556E-D11A-48D7-81C0-B1B5323EC136}" type="datetimeFigureOut">
               <a:rPr lang="zh-CN" altLang="en-US" smtClean="0"/>
-              <a:t>2022/5/21</a:t>
+              <a:t>2022/5/24</a:t>
             </a:fld>
             <a:endParaRPr lang="zh-CN" altLang="en-US"/>
           </a:p>
@@ -3296,7 +3296,7 @@
           <a:p>
             <a:fld id="{EE4C556E-D11A-48D7-81C0-B1B5323EC136}" type="datetimeFigureOut">
               <a:rPr lang="zh-CN" altLang="en-US" smtClean="0"/>
-              <a:t>2022/5/21</a:t>
+              <a:t>2022/5/24</a:t>
             </a:fld>
             <a:endParaRPr lang="zh-CN" altLang="en-US"/>
           </a:p>
@@ -3708,7 +3708,7 @@
           <a:p>
             <a:fld id="{EE4C556E-D11A-48D7-81C0-B1B5323EC136}" type="datetimeFigureOut">
               <a:rPr lang="zh-CN" altLang="en-US" smtClean="0"/>
-              <a:t>2022/5/21</a:t>
+              <a:t>2022/5/24</a:t>
             </a:fld>
             <a:endParaRPr lang="zh-CN" altLang="en-US"/>
           </a:p>
@@ -3974,7 +3974,7 @@
           <a:p>
             <a:fld id="{EE4C556E-D11A-48D7-81C0-B1B5323EC136}" type="datetimeFigureOut">
               <a:rPr lang="zh-CN" altLang="en-US" smtClean="0"/>
-              <a:t>2022/5/21</a:t>
+              <a:t>2022/5/24</a:t>
             </a:fld>
             <a:endParaRPr lang="zh-CN" altLang="en-US"/>
           </a:p>
@@ -4087,7 +4087,7 @@
           <a:p>
             <a:fld id="{EE4C556E-D11A-48D7-81C0-B1B5323EC136}" type="datetimeFigureOut">
               <a:rPr lang="zh-CN" altLang="en-US" smtClean="0"/>
-              <a:t>2022/5/21</a:t>
+              <a:t>2022/5/24</a:t>
             </a:fld>
             <a:endParaRPr lang="zh-CN" altLang="en-US"/>
           </a:p>
@@ -4398,7 +4398,7 @@
           <a:p>
             <a:fld id="{EE4C556E-D11A-48D7-81C0-B1B5323EC136}" type="datetimeFigureOut">
               <a:rPr lang="zh-CN" altLang="en-US" smtClean="0"/>
-              <a:t>2022/5/21</a:t>
+              <a:t>2022/5/24</a:t>
             </a:fld>
             <a:endParaRPr lang="zh-CN" altLang="en-US"/>
           </a:p>
@@ -4649,7 +4649,7 @@
           <a:p>
             <a:fld id="{EE4C556E-D11A-48D7-81C0-B1B5323EC136}" type="datetimeFigureOut">
               <a:rPr lang="zh-CN" altLang="en-US" smtClean="0"/>
-              <a:t>2022/5/21</a:t>
+              <a:t>2022/5/24</a:t>
             </a:fld>
             <a:endParaRPr lang="zh-CN" altLang="en-US"/>
           </a:p>
@@ -7569,7 +7569,7 @@
         </p:nvGrpSpPr>
         <p:grpSpPr>
           <a:xfrm>
-            <a:off x="645459" y="484095"/>
+            <a:off x="645459" y="510222"/>
             <a:ext cx="537883" cy="510988"/>
             <a:chOff x="753035" y="201706"/>
             <a:chExt cx="537883" cy="510988"/>
@@ -7720,74 +7720,19 @@
       </p:pic>
       <p:sp>
         <p:nvSpPr>
-          <p:cNvPr id="11" name="矩形 10">
-            <a:extLst>
-              <a:ext uri="{FF2B5EF4-FFF2-40B4-BE49-F238E27FC236}">
-                <a16:creationId xmlns:a16="http://schemas.microsoft.com/office/drawing/2014/main" id="{2515243E-3352-4900-AC47-F2F3AA9A8A10}"/>
-              </a:ext>
-            </a:extLst>
-          </p:cNvPr>
-          <p:cNvSpPr/>
+          <p:cNvPr id="22" name="TextBox 7">
+            <a:extLst>
+              <a:ext uri="{FF2B5EF4-FFF2-40B4-BE49-F238E27FC236}">
+                <a16:creationId xmlns:a16="http://schemas.microsoft.com/office/drawing/2014/main" id="{74D5F76D-D6A8-712E-D685-D138D5F350A5}"/>
+              </a:ext>
+            </a:extLst>
+          </p:cNvPr>
+          <p:cNvSpPr txBox="1"/>
           <p:nvPr/>
         </p:nvSpPr>
         <p:spPr>
           <a:xfrm>
-            <a:off x="557350" y="1262743"/>
-            <a:ext cx="11086010" cy="5277394"/>
-          </a:xfrm>
-          <a:prstGeom prst="rect">
-            <a:avLst/>
-          </a:prstGeom>
-          <a:noFill/>
-          <a:ln w="38100">
-            <a:solidFill>
-              <a:srgbClr val="C1A36C"/>
-            </a:solidFill>
-          </a:ln>
-        </p:spPr>
-        <p:style>
-          <a:lnRef idx="2">
-            <a:schemeClr val="accent1">
-              <a:shade val="50000"/>
-            </a:schemeClr>
-          </a:lnRef>
-          <a:fillRef idx="1">
-            <a:schemeClr val="accent1"/>
-          </a:fillRef>
-          <a:effectRef idx="0">
-            <a:schemeClr val="accent1"/>
-          </a:effectRef>
-          <a:fontRef idx="minor">
-            <a:schemeClr val="lt1"/>
-          </a:fontRef>
-        </p:style>
-        <p:txBody>
-          <a:bodyPr rtlCol="0" anchor="ctr"/>
-          <a:lstStyle/>
-          <a:p>
-            <a:pPr algn="ctr"/>
-            <a:endParaRPr lang="zh-CN" altLang="en-US">
-              <a:cs typeface="+mn-ea"/>
-              <a:sym typeface="+mn-lt"/>
-            </a:endParaRPr>
-          </a:p>
-        </p:txBody>
-      </p:sp>
-      <p:sp>
-        <p:nvSpPr>
-          <p:cNvPr id="22" name="TextBox 7">
-            <a:extLst>
-              <a:ext uri="{FF2B5EF4-FFF2-40B4-BE49-F238E27FC236}">
-                <a16:creationId xmlns:a16="http://schemas.microsoft.com/office/drawing/2014/main" id="{74D5F76D-D6A8-712E-D685-D138D5F350A5}"/>
-              </a:ext>
-            </a:extLst>
-          </p:cNvPr>
-          <p:cNvSpPr txBox="1"/>
-          <p:nvPr/>
-        </p:nvSpPr>
-        <p:spPr>
-          <a:xfrm>
-            <a:off x="1317813" y="464097"/>
+            <a:off x="1317813" y="437970"/>
             <a:ext cx="3365408" cy="584775"/>
           </a:xfrm>
           <a:prstGeom prst="rect">
@@ -7841,8 +7786,8 @@
         </p:nvSpPr>
         <p:spPr>
           <a:xfrm>
-            <a:off x="683109" y="1256959"/>
-            <a:ext cx="9959787" cy="5711948"/>
+            <a:off x="683109" y="1126330"/>
+            <a:ext cx="10728961" cy="5934060"/>
           </a:xfrm>
           <a:prstGeom prst="rect">
             <a:avLst/>
@@ -7868,13 +7813,14 @@
               <a:defRPr/>
             </a:pPr>
             <a:r>
-              <a:rPr lang="en-US" sz="1600" noProof="1">
+              <a:rPr lang="en-US" sz="1500" noProof="1">
                 <a:solidFill>
                   <a:schemeClr val="tx1">
                     <a:lumMod val="75000"/>
                     <a:lumOff val="25000"/>
                   </a:schemeClr>
                 </a:solidFill>
+                <a:latin typeface="Arial Rounded MT Bold" panose="020F0704030504030204" pitchFamily="34" charset="0"/>
                 <a:cs typeface="+mn-ea"/>
                 <a:sym typeface="+mn-lt"/>
               </a:rPr>
@@ -7896,17 +7842,18 @@
               <a:defRPr/>
             </a:pPr>
             <a:r>
-              <a:rPr lang="en-US" sz="1600" noProof="1">
+              <a:rPr lang="en-US" sz="1500" noProof="1">
                 <a:solidFill>
                   <a:schemeClr val="tx1">
                     <a:lumMod val="75000"/>
                     <a:lumOff val="25000"/>
                   </a:schemeClr>
                 </a:solidFill>
+                <a:latin typeface="Arial Rounded MT Bold" panose="020F0704030504030204" pitchFamily="34" charset="0"/>
                 <a:cs typeface="+mn-ea"/>
                 <a:sym typeface="+mn-lt"/>
               </a:rPr>
-              <a:t>We separate them into two ArrayLists, one with preferences, and the other doesn’t.</a:t>
+              <a:t>We separate them into two ArrayLists, one includes preferences, and the other doesn’t.</a:t>
             </a:r>
           </a:p>
           <a:p>
@@ -7924,17 +7871,18 @@
               <a:defRPr/>
             </a:pPr>
             <a:r>
-              <a:rPr lang="en-US" sz="1600" noProof="1">
+              <a:rPr lang="en-US" sz="1500" noProof="1">
                 <a:solidFill>
                   <a:schemeClr val="tx1">
                     <a:lumMod val="75000"/>
                     <a:lumOff val="25000"/>
                   </a:schemeClr>
                 </a:solidFill>
+                <a:latin typeface="Arial Rounded MT Bold" panose="020F0704030504030204" pitchFamily="34" charset="0"/>
                 <a:cs typeface="+mn-ea"/>
                 <a:sym typeface="+mn-lt"/>
               </a:rPr>
-              <a:t>Sort two ArrayList independently, then we concatenate them together as a new ArrayList.</a:t>
+              <a:t>Sort two ArrayList by year and id independently, then we concatenate them together as a new ArrayList.</a:t>
             </a:r>
           </a:p>
           <a:p>
@@ -7952,13 +7900,14 @@
               <a:defRPr/>
             </a:pPr>
             <a:r>
-              <a:rPr lang="en-US" sz="1600" noProof="1">
+              <a:rPr lang="en-US" sz="1500" noProof="1">
                 <a:solidFill>
                   <a:schemeClr val="tx1">
                     <a:lumMod val="75000"/>
                     <a:lumOff val="25000"/>
                   </a:schemeClr>
                 </a:solidFill>
+                <a:latin typeface="Arial Rounded MT Bold" panose="020F0704030504030204" pitchFamily="34" charset="0"/>
                 <a:cs typeface="+mn-ea"/>
                 <a:sym typeface="+mn-lt"/>
               </a:rPr>
@@ -7980,13 +7929,14 @@
               <a:defRPr/>
             </a:pPr>
             <a:r>
-              <a:rPr lang="en-US" sz="1600" noProof="1">
+              <a:rPr lang="en-US" sz="1500" noProof="1">
                 <a:solidFill>
                   <a:schemeClr val="tx1">
                     <a:lumMod val="75000"/>
                     <a:lumOff val="25000"/>
                   </a:schemeClr>
                 </a:solidFill>
+                <a:latin typeface="Arial Rounded MT Bold" panose="020F0704030504030204" pitchFamily="34" charset="0"/>
                 <a:cs typeface="+mn-ea"/>
                 <a:sym typeface="+mn-lt"/>
               </a:rPr>
@@ -8008,17 +7958,18 @@
               <a:defRPr/>
             </a:pPr>
             <a:r>
-              <a:rPr lang="en-US" sz="1600" noProof="1">
+              <a:rPr lang="en-US" sz="1500" noProof="1">
                 <a:solidFill>
                   <a:schemeClr val="tx1">
                     <a:lumMod val="75000"/>
                     <a:lumOff val="25000"/>
                   </a:schemeClr>
                 </a:solidFill>
+                <a:latin typeface="Arial Rounded MT Bold" panose="020F0704030504030204" pitchFamily="34" charset="0"/>
                 <a:cs typeface="+mn-ea"/>
                 <a:sym typeface="+mn-lt"/>
               </a:rPr>
-              <a:t>If not, we check the student’s next-preferred course and reassure there is still available spot. Add if there exists otherwise continue looking.</a:t>
+              <a:t>If not, we check the student’s next-preferred course and reassure there is still available spot, and so on.</a:t>
             </a:r>
           </a:p>
           <a:p>
@@ -8036,18 +7987,73 @@
               <a:defRPr/>
             </a:pPr>
             <a:r>
-              <a:rPr lang="en-US" sz="1600" noProof="1">
+              <a:rPr lang="en-US" sz="1500" noProof="1">
                 <a:solidFill>
                   <a:schemeClr val="tx1">
                     <a:lumMod val="75000"/>
                     <a:lumOff val="25000"/>
                   </a:schemeClr>
                 </a:solidFill>
+                <a:latin typeface="Arial Rounded MT Bold" panose="020F0704030504030204" pitchFamily="34" charset="0"/>
                 <a:cs typeface="+mn-ea"/>
                 <a:sym typeface="+mn-lt"/>
               </a:rPr>
               <a:t>Repeat 5. and 6. for the rest of the students with preferences.</a:t>
             </a:r>
+          </a:p>
+          <a:p>
+            <a:pPr marL="342900" indent="-342900" defTabSz="1828800">
+              <a:lnSpc>
+                <a:spcPct val="150000"/>
+              </a:lnSpc>
+              <a:spcBef>
+                <a:spcPts val="1200"/>
+              </a:spcBef>
+              <a:buClr>
+                <a:srgbClr val="E24848"/>
+              </a:buClr>
+              <a:buAutoNum type="arabicPeriod"/>
+              <a:defRPr/>
+            </a:pPr>
+            <a:r>
+              <a:rPr lang="en-US" sz="1500" noProof="1">
+                <a:solidFill>
+                  <a:schemeClr val="tx1">
+                    <a:lumMod val="75000"/>
+                    <a:lumOff val="25000"/>
+                  </a:schemeClr>
+                </a:solidFill>
+                <a:latin typeface="Arial Rounded MT Bold" panose="020F0704030504030204" pitchFamily="34" charset="0"/>
+                <a:cs typeface="+mn-ea"/>
+                <a:sym typeface="+mn-lt"/>
+              </a:rPr>
+              <a:t>If there are students with preferneces still get no chances to pick a course, </a:t>
+            </a:r>
+            <a:r>
+              <a:rPr lang="en-US" altLang="zh-TW" sz="1500" noProof="1">
+                <a:solidFill>
+                  <a:schemeClr val="tx1">
+                    <a:lumMod val="75000"/>
+                    <a:lumOff val="25000"/>
+                  </a:schemeClr>
+                </a:solidFill>
+                <a:latin typeface="Arial Rounded MT Bold" panose="020F0704030504030204" pitchFamily="34" charset="0"/>
+                <a:cs typeface="+mn-ea"/>
+                <a:sym typeface="+mn-lt"/>
+              </a:rPr>
+              <a:t>we loop through the courses to find the rest of the spots of courses for students to add.</a:t>
+            </a:r>
+            <a:endParaRPr lang="en-US" sz="1500" noProof="1">
+              <a:solidFill>
+                <a:schemeClr val="tx1">
+                  <a:lumMod val="75000"/>
+                  <a:lumOff val="25000"/>
+                </a:schemeClr>
+              </a:solidFill>
+              <a:latin typeface="Arial Rounded MT Bold" panose="020F0704030504030204" pitchFamily="34" charset="0"/>
+              <a:cs typeface="+mn-ea"/>
+              <a:sym typeface="+mn-lt"/>
+            </a:endParaRPr>
           </a:p>
           <a:p>
             <a:pPr marL="342900" indent="-342900" defTabSz="1828800" rtl="0">
@@ -8064,17 +8070,18 @@
               <a:defRPr/>
             </a:pPr>
             <a:r>
-              <a:rPr lang="en-US" sz="1600" noProof="1">
+              <a:rPr lang="en-US" sz="1500" noProof="1">
                 <a:solidFill>
                   <a:schemeClr val="tx1">
                     <a:lumMod val="75000"/>
                     <a:lumOff val="25000"/>
                   </a:schemeClr>
                 </a:solidFill>
+                <a:latin typeface="Arial Rounded MT Bold" panose="020F0704030504030204" pitchFamily="34" charset="0"/>
                 <a:cs typeface="+mn-ea"/>
                 <a:sym typeface="+mn-lt"/>
               </a:rPr>
-              <a:t>Finally, those with no preferences, we loop through the courses to find the rest of the spots for students to add.</a:t>
+              <a:t>Finally, those with no preferences, we loop through the courses to find the rest of the spots of courses for students to add.</a:t>
             </a:r>
           </a:p>
           <a:p>
@@ -8091,13 +8098,14 @@
               <a:buAutoNum type="arabicPeriod"/>
               <a:defRPr/>
             </a:pPr>
-            <a:endParaRPr lang="en-US" sz="1600" noProof="1">
+            <a:endParaRPr lang="en-US" sz="1500" noProof="1">
               <a:solidFill>
                 <a:schemeClr val="tx1">
                   <a:lumMod val="75000"/>
                   <a:lumOff val="25000"/>
                 </a:schemeClr>
               </a:solidFill>
+              <a:latin typeface="Arial Rounded MT Bold" panose="020F0704030504030204" pitchFamily="34" charset="0"/>
               <a:cs typeface="+mn-ea"/>
               <a:sym typeface="+mn-lt"/>
             </a:endParaRPr>

</xml_diff>

<commit_message>
final update on code, ppt, and pdf
</commit_message>
<xml_diff>
--- a/M104020014周紘樟_ITR_HW2.pptx
+++ b/M104020014周紘樟_ITR_HW2.pptx
@@ -213,7 +213,7 @@
           <a:p>
             <a:fld id="{E9C7C8D6-8378-491C-A88C-F5C0F1DDB3DF}" type="datetimeFigureOut">
               <a:rPr lang="zh-CN" altLang="en-US" smtClean="0"/>
-              <a:t>2022/5/24</a:t>
+              <a:t>2022/5/27</a:t>
             </a:fld>
             <a:endParaRPr lang="zh-CN" altLang="en-US"/>
           </a:p>
@@ -1047,7 +1047,7 @@
           <a:p>
             <a:fld id="{EE4C556E-D11A-48D7-81C0-B1B5323EC136}" type="datetimeFigureOut">
               <a:rPr lang="zh-CN" altLang="en-US" smtClean="0"/>
-              <a:t>2022/5/24</a:t>
+              <a:t>2022/5/27</a:t>
             </a:fld>
             <a:endParaRPr lang="zh-CN" altLang="en-US"/>
           </a:p>
@@ -1335,7 +1335,7 @@
           <a:p>
             <a:fld id="{EE4C556E-D11A-48D7-81C0-B1B5323EC136}" type="datetimeFigureOut">
               <a:rPr lang="zh-CN" altLang="en-US" smtClean="0"/>
-              <a:t>2022/5/24</a:t>
+              <a:t>2022/5/27</a:t>
             </a:fld>
             <a:endParaRPr lang="zh-CN" altLang="en-US"/>
           </a:p>
@@ -1533,7 +1533,7 @@
           <a:p>
             <a:fld id="{EE4C556E-D11A-48D7-81C0-B1B5323EC136}" type="datetimeFigureOut">
               <a:rPr lang="zh-CN" altLang="en-US" smtClean="0"/>
-              <a:t>2022/5/24</a:t>
+              <a:t>2022/5/27</a:t>
             </a:fld>
             <a:endParaRPr lang="zh-CN" altLang="en-US"/>
           </a:p>
@@ -1741,7 +1741,7 @@
           <a:p>
             <a:fld id="{EE4C556E-D11A-48D7-81C0-B1B5323EC136}" type="datetimeFigureOut">
               <a:rPr lang="zh-CN" altLang="en-US" smtClean="0"/>
-              <a:t>2022/5/24</a:t>
+              <a:t>2022/5/27</a:t>
             </a:fld>
             <a:endParaRPr lang="zh-CN" altLang="en-US"/>
           </a:p>
@@ -1950,7 +1950,7 @@
                 </a:solidFill>
               </a:rPr>
               <a:pPr/>
-              <a:t>2022/5/24</a:t>
+              <a:t>2022/5/27</a:t>
             </a:fld>
             <a:endParaRPr lang="zh-CN" altLang="en-US">
               <a:solidFill>
@@ -2180,7 +2180,7 @@
                 </a:solidFill>
               </a:rPr>
               <a:pPr/>
-              <a:t>2022/5/24</a:t>
+              <a:t>2022/5/27</a:t>
             </a:fld>
             <a:endParaRPr lang="zh-CN" altLang="en-US">
               <a:solidFill>
@@ -2429,7 +2429,7 @@
           <a:p>
             <a:fld id="{EE4C556E-D11A-48D7-81C0-B1B5323EC136}" type="datetimeFigureOut">
               <a:rPr lang="zh-CN" altLang="en-US" smtClean="0"/>
-              <a:t>2022/5/24</a:t>
+              <a:t>2022/5/27</a:t>
             </a:fld>
             <a:endParaRPr lang="zh-CN" altLang="en-US"/>
           </a:p>
@@ -2704,7 +2704,7 @@
           <a:p>
             <a:fld id="{EE4C556E-D11A-48D7-81C0-B1B5323EC136}" type="datetimeFigureOut">
               <a:rPr lang="zh-CN" altLang="en-US" smtClean="0"/>
-              <a:t>2022/5/24</a:t>
+              <a:t>2022/5/27</a:t>
             </a:fld>
             <a:endParaRPr lang="zh-CN" altLang="en-US"/>
           </a:p>
@@ -2969,7 +2969,7 @@
           <a:p>
             <a:fld id="{EE4C556E-D11A-48D7-81C0-B1B5323EC136}" type="datetimeFigureOut">
               <a:rPr lang="zh-CN" altLang="en-US" smtClean="0"/>
-              <a:t>2022/5/24</a:t>
+              <a:t>2022/5/27</a:t>
             </a:fld>
             <a:endParaRPr lang="zh-CN" altLang="en-US"/>
           </a:p>
@@ -3381,7 +3381,7 @@
           <a:p>
             <a:fld id="{EE4C556E-D11A-48D7-81C0-B1B5323EC136}" type="datetimeFigureOut">
               <a:rPr lang="zh-CN" altLang="en-US" smtClean="0"/>
-              <a:t>2022/5/24</a:t>
+              <a:t>2022/5/27</a:t>
             </a:fld>
             <a:endParaRPr lang="zh-CN" altLang="en-US"/>
           </a:p>
@@ -3793,7 +3793,7 @@
           <a:p>
             <a:fld id="{EE4C556E-D11A-48D7-81C0-B1B5323EC136}" type="datetimeFigureOut">
               <a:rPr lang="zh-CN" altLang="en-US" smtClean="0"/>
-              <a:t>2022/5/24</a:t>
+              <a:t>2022/5/27</a:t>
             </a:fld>
             <a:endParaRPr lang="zh-CN" altLang="en-US"/>
           </a:p>
@@ -4059,7 +4059,7 @@
           <a:p>
             <a:fld id="{EE4C556E-D11A-48D7-81C0-B1B5323EC136}" type="datetimeFigureOut">
               <a:rPr lang="zh-CN" altLang="en-US" smtClean="0"/>
-              <a:t>2022/5/24</a:t>
+              <a:t>2022/5/27</a:t>
             </a:fld>
             <a:endParaRPr lang="zh-CN" altLang="en-US"/>
           </a:p>
@@ -4172,7 +4172,7 @@
           <a:p>
             <a:fld id="{EE4C556E-D11A-48D7-81C0-B1B5323EC136}" type="datetimeFigureOut">
               <a:rPr lang="zh-CN" altLang="en-US" smtClean="0"/>
-              <a:t>2022/5/24</a:t>
+              <a:t>2022/5/27</a:t>
             </a:fld>
             <a:endParaRPr lang="zh-CN" altLang="en-US"/>
           </a:p>
@@ -4483,7 +4483,7 @@
           <a:p>
             <a:fld id="{EE4C556E-D11A-48D7-81C0-B1B5323EC136}" type="datetimeFigureOut">
               <a:rPr lang="zh-CN" altLang="en-US" smtClean="0"/>
-              <a:t>2022/5/24</a:t>
+              <a:t>2022/5/27</a:t>
             </a:fld>
             <a:endParaRPr lang="zh-CN" altLang="en-US"/>
           </a:p>
@@ -4734,7 +4734,7 @@
           <a:p>
             <a:fld id="{EE4C556E-D11A-48D7-81C0-B1B5323EC136}" type="datetimeFigureOut">
               <a:rPr lang="zh-CN" altLang="en-US" smtClean="0"/>
-              <a:t>2022/5/24</a:t>
+              <a:t>2022/5/27</a:t>
             </a:fld>
             <a:endParaRPr lang="zh-CN" altLang="en-US"/>
           </a:p>
@@ -9053,7 +9053,52 @@
                     <a:cs typeface="+mn-ea"/>
                     <a:sym typeface="+mn-lt"/>
                   </a:rPr>
-                  <a:t>Preference simulation process due to nested for loop : </a:t>
+                  <a:t>Preference simulation process</a:t>
+                </a:r>
+                <a:r>
+                  <a:rPr lang="zh-TW" altLang="en-US" sz="1400" noProof="1">
+                    <a:solidFill>
+                      <a:schemeClr val="tx1">
+                        <a:lumMod val="75000"/>
+                        <a:lumOff val="25000"/>
+                      </a:schemeClr>
+                    </a:solidFill>
+                    <a:latin typeface="Fira Code Retina" panose="020B0809050000020004" pitchFamily="49" charset="0"/>
+                    <a:ea typeface="Fira Code Retina" panose="020B0809050000020004" pitchFamily="49" charset="0"/>
+                    <a:cs typeface="+mn-ea"/>
+                    <a:sym typeface="+mn-lt"/>
+                  </a:rPr>
+                  <a:t> </a:t>
+                </a:r>
+                <a:r>
+                  <a:rPr lang="en-US" altLang="zh-TW" sz="1400" noProof="1">
+                    <a:solidFill>
+                      <a:schemeClr val="tx1">
+                        <a:lumMod val="75000"/>
+                        <a:lumOff val="25000"/>
+                      </a:schemeClr>
+                    </a:solidFill>
+                    <a:latin typeface="Fira Code Retina" panose="020B0809050000020004" pitchFamily="49" charset="0"/>
+                    <a:ea typeface="Fira Code Retina" panose="020B0809050000020004" pitchFamily="49" charset="0"/>
+                    <a:cs typeface="+mn-ea"/>
+                    <a:sym typeface="+mn-lt"/>
+                  </a:rPr>
+                  <a:t>by nested for loop</a:t>
+                </a:r>
+                <a:r>
+                  <a:rPr lang="en-US" sz="1400" noProof="1">
+                    <a:solidFill>
+                      <a:schemeClr val="tx1">
+                        <a:lumMod val="75000"/>
+                        <a:lumOff val="25000"/>
+                      </a:schemeClr>
+                    </a:solidFill>
+                    <a:latin typeface="Fira Code Retina" panose="020B0809050000020004" pitchFamily="49" charset="0"/>
+                    <a:ea typeface="Fira Code Retina" panose="020B0809050000020004" pitchFamily="49" charset="0"/>
+                    <a:cs typeface="+mn-ea"/>
+                    <a:sym typeface="+mn-lt"/>
+                  </a:rPr>
+                  <a:t>: </a:t>
                 </a:r>
                 <a:endParaRPr lang="en-US" sz="1400" b="1" i="1" noProof="1">
                   <a:solidFill>
@@ -9105,7 +9150,7 @@
                             <a:lumOff val="25000"/>
                           </a:schemeClr>
                         </a:solidFill>
-                        <a:latin typeface="Fira Code Retina" panose="020B0809050000020004" pitchFamily="49" charset="0"/>
+                        <a:latin typeface="Cambria Math" panose="02040503050406030204" pitchFamily="18" charset="0"/>
                         <a:ea typeface="Fira Code Retina" panose="020B0809050000020004" pitchFamily="49" charset="0"/>
                         <a:cs typeface="+mn-ea"/>
                         <a:sym typeface="+mn-lt"/>
@@ -9120,7 +9165,7 @@
                             <a:lumOff val="25000"/>
                           </a:schemeClr>
                         </a:solidFill>
-                        <a:latin typeface="Fira Code Retina" panose="020B0809050000020004" pitchFamily="49" charset="0"/>
+                        <a:latin typeface="Cambria Math" panose="02040503050406030204" pitchFamily="18" charset="0"/>
                         <a:ea typeface="Fira Code Retina" panose="020B0809050000020004" pitchFamily="49" charset="0"/>
                         <a:cs typeface="+mn-ea"/>
                         <a:sym typeface="+mn-lt"/>
@@ -9130,14 +9175,14 @@
                     <m:sSup>
                       <m:sSupPr>
                         <m:ctrlPr>
-                          <a:rPr lang="en-US" altLang="zh-TW" sz="1400" b="1" noProof="1">
+                          <a:rPr lang="en-US" altLang="zh-TW" sz="1400" b="1" i="1" noProof="1">
                             <a:solidFill>
                               <a:schemeClr val="tx1">
                                 <a:lumMod val="75000"/>
                                 <a:lumOff val="25000"/>
                               </a:schemeClr>
                             </a:solidFill>
-                            <a:latin typeface="Fira Code Retina" panose="020B0809050000020004" pitchFamily="49" charset="0"/>
+                            <a:latin typeface="Cambria Math" panose="02040503050406030204" pitchFamily="18" charset="0"/>
                             <a:ea typeface="Fira Code Retina" panose="020B0809050000020004" pitchFamily="49" charset="0"/>
                             <a:cs typeface="+mn-ea"/>
                             <a:sym typeface="+mn-lt"/>
@@ -9153,7 +9198,7 @@
                                 <a:lumOff val="25000"/>
                               </a:schemeClr>
                             </a:solidFill>
-                            <a:latin typeface="Fira Code Retina" panose="020B0809050000020004" pitchFamily="49" charset="0"/>
+                            <a:latin typeface="Cambria Math" panose="02040503050406030204" pitchFamily="18" charset="0"/>
                             <a:ea typeface="Fira Code Retina" panose="020B0809050000020004" pitchFamily="49" charset="0"/>
                             <a:cs typeface="+mn-ea"/>
                             <a:sym typeface="+mn-lt"/>
@@ -9170,7 +9215,7 @@
                                 <a:lumOff val="25000"/>
                               </a:schemeClr>
                             </a:solidFill>
-                            <a:latin typeface="Fira Code Retina" panose="020B0809050000020004" pitchFamily="49" charset="0"/>
+                            <a:latin typeface="Cambria Math" panose="02040503050406030204" pitchFamily="18" charset="0"/>
                             <a:ea typeface="Fira Code Retina" panose="020B0809050000020004" pitchFamily="49" charset="0"/>
                             <a:cs typeface="+mn-ea"/>
                             <a:sym typeface="+mn-lt"/>
@@ -9187,7 +9232,7 @@
                             <a:lumOff val="25000"/>
                           </a:schemeClr>
                         </a:solidFill>
-                        <a:latin typeface="Fira Code Retina" panose="020B0809050000020004" pitchFamily="49" charset="0"/>
+                        <a:latin typeface="Cambria Math" panose="02040503050406030204" pitchFamily="18" charset="0"/>
                         <a:ea typeface="Fira Code Retina" panose="020B0809050000020004" pitchFamily="49" charset="0"/>
                         <a:cs typeface="+mn-ea"/>
                         <a:sym typeface="+mn-lt"/>
@@ -9250,7 +9295,7 @@
                     <a:cs typeface="+mn-ea"/>
                     <a:sym typeface="+mn-lt"/>
                   </a:rPr>
-                  <a:t>Time Complexity for the code </a:t>
+                  <a:t>Space Complexity for the code </a:t>
                 </a:r>
               </a:p>
               <a:p>
@@ -9320,7 +9365,7 @@
                             <a:lumOff val="25000"/>
                           </a:schemeClr>
                         </a:solidFill>
-                        <a:latin typeface="Fira Code Retina" panose="020B0809050000020004" pitchFamily="49" charset="0"/>
+                        <a:latin typeface="Cambria Math" panose="02040503050406030204" pitchFamily="18" charset="0"/>
                         <a:ea typeface="Fira Code Retina" panose="020B0809050000020004" pitchFamily="49" charset="0"/>
                         <a:cs typeface="+mn-ea"/>
                         <a:sym typeface="+mn-lt"/>
@@ -9335,7 +9380,7 @@
                             <a:lumOff val="25000"/>
                           </a:schemeClr>
                         </a:solidFill>
-                        <a:latin typeface="Fira Code Retina" panose="020B0809050000020004" pitchFamily="49" charset="0"/>
+                        <a:latin typeface="Cambria Math" panose="02040503050406030204" pitchFamily="18" charset="0"/>
                         <a:ea typeface="Fira Code Retina" panose="020B0809050000020004" pitchFamily="49" charset="0"/>
                         <a:cs typeface="+mn-ea"/>
                         <a:sym typeface="+mn-lt"/>
@@ -9350,7 +9395,7 @@
                             <a:lumOff val="25000"/>
                           </a:schemeClr>
                         </a:solidFill>
-                        <a:latin typeface="Fira Code Retina" panose="020B0809050000020004" pitchFamily="49" charset="0"/>
+                        <a:latin typeface="Cambria Math" panose="02040503050406030204" pitchFamily="18" charset="0"/>
                         <a:ea typeface="Fira Code Retina" panose="020B0809050000020004" pitchFamily="49" charset="0"/>
                         <a:cs typeface="+mn-ea"/>
                         <a:sym typeface="+mn-lt"/>
@@ -9365,7 +9410,7 @@
                             <a:lumOff val="25000"/>
                           </a:schemeClr>
                         </a:solidFill>
-                        <a:latin typeface="Fira Code Retina" panose="020B0809050000020004" pitchFamily="49" charset="0"/>
+                        <a:latin typeface="Cambria Math" panose="02040503050406030204" pitchFamily="18" charset="0"/>
                         <a:ea typeface="Fira Code Retina" panose="020B0809050000020004" pitchFamily="49" charset="0"/>
                         <a:cs typeface="+mn-ea"/>
                         <a:sym typeface="+mn-lt"/>

</xml_diff>